<commit_message>
updating ML and data preprocessing of data to presentation
</commit_message>
<xml_diff>
--- a/COVID-19 Analysis.pptx
+++ b/COVID-19 Analysis.pptx
@@ -1614,7 +1614,7 @@
   <p:cSld>
     <p:spTree>
       <p:nvGrpSpPr>
-        <p:cNvPr id="270" name="Shape 270"/>
+        <p:cNvPr id="271" name="Shape 271"/>
         <p:cNvGrpSpPr/>
         <p:nvPr/>
       </p:nvGrpSpPr>
@@ -1628,7 +1628,7 @@
       </p:grpSpPr>
       <p:sp>
         <p:nvSpPr>
-          <p:cNvPr id="271" name="Google Shape;271;g13e30ec05fc_1_7:notes"/>
+          <p:cNvPr id="272" name="Google Shape;272;g13e30ec05fc_1_7:notes"/>
           <p:cNvSpPr/>
           <p:nvPr>
             <p:ph idx="2" type="sldImg"/>
@@ -1663,7 +1663,7 @@
       </p:sp>
       <p:sp>
         <p:nvSpPr>
-          <p:cNvPr id="272" name="Google Shape;272;g13e30ec05fc_1_7:notes"/>
+          <p:cNvPr id="273" name="Google Shape;273;g13e30ec05fc_1_7:notes"/>
           <p:cNvSpPr txBox="1"/>
           <p:nvPr>
             <p:ph idx="1" type="body"/>
@@ -1713,7 +1713,7 @@
   <p:cSld>
     <p:spTree>
       <p:nvGrpSpPr>
-        <p:cNvPr id="277" name="Shape 277"/>
+        <p:cNvPr id="279" name="Shape 279"/>
         <p:cNvGrpSpPr/>
         <p:nvPr/>
       </p:nvGrpSpPr>
@@ -1727,7 +1727,7 @@
       </p:grpSpPr>
       <p:sp>
         <p:nvSpPr>
-          <p:cNvPr id="278" name="Google Shape;278;g13e30ec05fc_1_240:notes"/>
+          <p:cNvPr id="280" name="Google Shape;280;g13e30ec05fc_1_240:notes"/>
           <p:cNvSpPr/>
           <p:nvPr>
             <p:ph idx="2" type="sldImg"/>
@@ -1762,7 +1762,7 @@
       </p:sp>
       <p:sp>
         <p:nvSpPr>
-          <p:cNvPr id="279" name="Google Shape;279;g13e30ec05fc_1_240:notes"/>
+          <p:cNvPr id="281" name="Google Shape;281;g13e30ec05fc_1_240:notes"/>
           <p:cNvSpPr txBox="1"/>
           <p:nvPr>
             <p:ph idx="1" type="body"/>
@@ -1911,7 +1911,7 @@
   <p:cSld>
     <p:spTree>
       <p:nvGrpSpPr>
-        <p:cNvPr id="283" name="Shape 283"/>
+        <p:cNvPr id="286" name="Shape 286"/>
         <p:cNvGrpSpPr/>
         <p:nvPr/>
       </p:nvGrpSpPr>
@@ -1925,7 +1925,7 @@
       </p:grpSpPr>
       <p:sp>
         <p:nvSpPr>
-          <p:cNvPr id="284" name="Google Shape;284;g13e30ec05fc_1_249:notes"/>
+          <p:cNvPr id="287" name="Google Shape;287;g13e30ec05fc_1_249:notes"/>
           <p:cNvSpPr/>
           <p:nvPr>
             <p:ph idx="2" type="sldImg"/>
@@ -1960,7 +1960,7 @@
       </p:sp>
       <p:sp>
         <p:nvSpPr>
-          <p:cNvPr id="285" name="Google Shape;285;g13e30ec05fc_1_249:notes"/>
+          <p:cNvPr id="288" name="Google Shape;288;g13e30ec05fc_1_249:notes"/>
           <p:cNvSpPr txBox="1"/>
           <p:nvPr>
             <p:ph idx="1" type="body"/>
@@ -2010,7 +2010,7 @@
   <p:cSld>
     <p:spTree>
       <p:nvGrpSpPr>
-        <p:cNvPr id="291" name="Shape 291"/>
+        <p:cNvPr id="294" name="Shape 294"/>
         <p:cNvGrpSpPr/>
         <p:nvPr/>
       </p:nvGrpSpPr>
@@ -2024,7 +2024,7 @@
       </p:grpSpPr>
       <p:sp>
         <p:nvSpPr>
-          <p:cNvPr id="292" name="Google Shape;292;g13e30ec05fc_1_245:notes"/>
+          <p:cNvPr id="295" name="Google Shape;295;g13e30ec05fc_1_245:notes"/>
           <p:cNvSpPr/>
           <p:nvPr>
             <p:ph idx="2" type="sldImg"/>
@@ -2059,7 +2059,7 @@
       </p:sp>
       <p:sp>
         <p:nvSpPr>
-          <p:cNvPr id="293" name="Google Shape;293;g13e30ec05fc_1_245:notes"/>
+          <p:cNvPr id="296" name="Google Shape;296;g13e30ec05fc_1_245:notes"/>
           <p:cNvSpPr txBox="1"/>
           <p:nvPr>
             <p:ph idx="1" type="body"/>
@@ -2109,7 +2109,7 @@
   <p:cSld>
     <p:spTree>
       <p:nvGrpSpPr>
-        <p:cNvPr id="300" name="Shape 300"/>
+        <p:cNvPr id="304" name="Shape 304"/>
         <p:cNvGrpSpPr/>
         <p:nvPr/>
       </p:nvGrpSpPr>
@@ -2123,7 +2123,7 @@
       </p:grpSpPr>
       <p:sp>
         <p:nvSpPr>
-          <p:cNvPr id="301" name="Google Shape;301;g13e30ec05fc_1_218:notes"/>
+          <p:cNvPr id="305" name="Google Shape;305;g13e30ec05fc_1_218:notes"/>
           <p:cNvSpPr/>
           <p:nvPr>
             <p:ph idx="2" type="sldImg"/>
@@ -2158,7 +2158,7 @@
       </p:sp>
       <p:sp>
         <p:nvSpPr>
-          <p:cNvPr id="302" name="Google Shape;302;g13e30ec05fc_1_218:notes"/>
+          <p:cNvPr id="306" name="Google Shape;306;g13e30ec05fc_1_218:notes"/>
           <p:cNvSpPr txBox="1"/>
           <p:nvPr>
             <p:ph idx="1" type="body"/>
@@ -2208,7 +2208,7 @@
   <p:cSld>
     <p:spTree>
       <p:nvGrpSpPr>
-        <p:cNvPr id="317" name="Shape 317"/>
+        <p:cNvPr id="321" name="Shape 321"/>
         <p:cNvGrpSpPr/>
         <p:nvPr/>
       </p:nvGrpSpPr>
@@ -2222,7 +2222,7 @@
       </p:grpSpPr>
       <p:sp>
         <p:nvSpPr>
-          <p:cNvPr id="318" name="Google Shape;318;gc6f9e470d_0_126:notes"/>
+          <p:cNvPr id="322" name="Google Shape;322;gc6f9e470d_0_126:notes"/>
           <p:cNvSpPr/>
           <p:nvPr>
             <p:ph idx="2" type="sldImg"/>
@@ -2257,7 +2257,7 @@
       </p:sp>
       <p:sp>
         <p:nvSpPr>
-          <p:cNvPr id="319" name="Google Shape;319;gc6f9e470d_0_126:notes"/>
+          <p:cNvPr id="323" name="Google Shape;323;gc6f9e470d_0_126:notes"/>
           <p:cNvSpPr txBox="1"/>
           <p:nvPr>
             <p:ph idx="1" type="body"/>
@@ -2307,7 +2307,7 @@
   <p:cSld>
     <p:spTree>
       <p:nvGrpSpPr>
-        <p:cNvPr id="354" name="Shape 354"/>
+        <p:cNvPr id="358" name="Shape 358"/>
         <p:cNvGrpSpPr/>
         <p:nvPr/>
       </p:nvGrpSpPr>
@@ -2321,7 +2321,7 @@
       </p:grpSpPr>
       <p:sp>
         <p:nvSpPr>
-          <p:cNvPr id="355" name="Google Shape;355;g13e30ec05fc_1_786:notes"/>
+          <p:cNvPr id="359" name="Google Shape;359;g13e30ec05fc_1_786:notes"/>
           <p:cNvSpPr/>
           <p:nvPr>
             <p:ph idx="2" type="sldImg"/>
@@ -2356,7 +2356,7 @@
       </p:sp>
       <p:sp>
         <p:nvSpPr>
-          <p:cNvPr id="356" name="Google Shape;356;g13e30ec05fc_1_786:notes"/>
+          <p:cNvPr id="360" name="Google Shape;360;g13e30ec05fc_1_786:notes"/>
           <p:cNvSpPr txBox="1"/>
           <p:nvPr>
             <p:ph idx="1" type="body"/>
@@ -11941,9 +11941,21 @@
                 <a:buChar char="●"/>
               </a:pPr>
               <a:r>
-                <a:t/>
+                <a:rPr lang="en">
+                  <a:highlight>
+                    <a:srgbClr val="FFFFFF"/>
+                  </a:highlight>
+                  <a:latin typeface="Roboto"/>
+                  <a:ea typeface="Roboto"/>
+                  <a:cs typeface="Roboto"/>
+                  <a:sym typeface="Roboto"/>
+                </a:rPr>
+                <a:t>Additional columns were created to represent the differences between daily total vaccinations and daily people total vaccinated</a:t>
               </a:r>
               <a:endParaRPr>
+                <a:highlight>
+                  <a:srgbClr val="FFFFFF"/>
+                </a:highlight>
                 <a:latin typeface="Roboto"/>
                 <a:ea typeface="Roboto"/>
                 <a:cs typeface="Roboto"/>
@@ -11963,9 +11975,21 @@
                 <a:buChar char="●"/>
               </a:pPr>
               <a:r>
-                <a:t/>
+                <a:rPr lang="en">
+                  <a:highlight>
+                    <a:srgbClr val="FFFFFF"/>
+                  </a:highlight>
+                  <a:latin typeface="Roboto"/>
+                  <a:ea typeface="Roboto"/>
+                  <a:cs typeface="Roboto"/>
+                  <a:sym typeface="Roboto"/>
+                </a:rPr>
+                <a:t>Columns were then normalized to per 100,000 people of each location's population</a:t>
               </a:r>
               <a:endParaRPr>
+                <a:highlight>
+                  <a:srgbClr val="FFFFFF"/>
+                </a:highlight>
                 <a:latin typeface="Roboto"/>
                 <a:ea typeface="Roboto"/>
                 <a:cs typeface="Roboto"/>
@@ -11985,7 +12009,16 @@
                 <a:buChar char="●"/>
               </a:pPr>
               <a:r>
-                <a:t/>
+                <a:rPr lang="en">
+                  <a:highlight>
+                    <a:srgbClr val="FFFFFF"/>
+                  </a:highlight>
+                  <a:latin typeface="Roboto"/>
+                  <a:ea typeface="Roboto"/>
+                  <a:cs typeface="Roboto"/>
+                  <a:sym typeface="Roboto"/>
+                </a:rPr>
+                <a:t>The cleaned dataset was split into two dataframes: one for cases prediction and another for deaths predictions</a:t>
               </a:r>
               <a:endParaRPr>
                 <a:latin typeface="Roboto"/>
@@ -12133,10 +12166,7 @@
           </a:bodyPr>
           <a:lstStyle/>
           <a:p>
-            <a:pPr indent="-330200" lvl="0" marL="457200" rtl="0" algn="l">
-              <a:lnSpc>
-                <a:spcPct val="100000"/>
-              </a:lnSpc>
+            <a:pPr indent="-317500" lvl="0" marL="457200" rtl="0" algn="l">
               <a:spcBef>
                 <a:spcPts val="0"/>
               </a:spcBef>
@@ -12146,51 +12176,22 @@
               <a:buClr>
                 <a:srgbClr val="000000"/>
               </a:buClr>
-              <a:buSzPts val="1600"/>
+              <a:buSzPts val="1400"/>
               <a:buFont typeface="Roboto"/>
               <a:buChar char="●"/>
             </a:pPr>
             <a:r>
-              <a:rPr lang="en" sz="1600">
+              <a:rPr lang="en" sz="1400">
                 <a:solidFill>
                   <a:srgbClr val="000000"/>
                 </a:solidFill>
-              </a:rPr>
-              <a:t>XXXXXXXXXXXXXXXXXXXXXXXXXXXXXXXXXXXXX</a:t>
-            </a:r>
-            <a:endParaRPr sz="1600">
-              <a:solidFill>
-                <a:srgbClr val="000000"/>
-              </a:solidFill>
-            </a:endParaRPr>
-          </a:p>
-          <a:p>
-            <a:pPr indent="-330200" lvl="0" marL="457200" rtl="0" algn="l">
-              <a:spcBef>
-                <a:spcPts val="1000"/>
-              </a:spcBef>
-              <a:spcAft>
-                <a:spcPts val="0"/>
-              </a:spcAft>
-              <a:buClr>
-                <a:srgbClr val="000000"/>
-              </a:buClr>
-              <a:buSzPts val="1600"/>
-              <a:buFont typeface="Roboto"/>
-              <a:buChar char="●"/>
-            </a:pPr>
-            <a:r>
-              <a:rPr lang="en" sz="1600">
-                <a:solidFill>
-                  <a:srgbClr val="000000"/>
-                </a:solidFill>
                 <a:highlight>
-                  <a:schemeClr val="lt1"/>
+                  <a:srgbClr val="FFFFFF"/>
                 </a:highlight>
               </a:rPr>
-              <a:t>XXXXXXXXXXXXXXXXXXXXXXX</a:t>
+              <a:t>Random Forest Regressors are a type of ensemble learning models that combines multiple smaller models into a more robust and accurate model</a:t>
             </a:r>
-            <a:endParaRPr sz="1600">
+            <a:endParaRPr sz="1400">
               <a:solidFill>
                 <a:srgbClr val="000000"/>
               </a:solidFill>
@@ -12200,7 +12201,7 @@
             </a:endParaRPr>
           </a:p>
           <a:p>
-            <a:pPr indent="-330200" lvl="0" marL="457200" rtl="0" algn="l">
+            <a:pPr indent="-317500" lvl="0" marL="457200" rtl="0" algn="l">
               <a:spcBef>
                 <a:spcPts val="1000"/>
               </a:spcBef>
@@ -12210,22 +12211,22 @@
               <a:buClr>
                 <a:srgbClr val="000000"/>
               </a:buClr>
-              <a:buSzPts val="1600"/>
+              <a:buSzPts val="1400"/>
               <a:buFont typeface="Roboto"/>
               <a:buChar char="●"/>
             </a:pPr>
             <a:r>
-              <a:rPr lang="en" sz="1600">
+              <a:rPr lang="en" sz="1400">
                 <a:solidFill>
                   <a:srgbClr val="000000"/>
                 </a:solidFill>
                 <a:highlight>
-                  <a:schemeClr val="lt1"/>
+                  <a:srgbClr val="FFFFFF"/>
                 </a:highlight>
               </a:rPr>
-              <a:t>XXXXXXXXXXXXXXXXXXXXXXXXXXXXXXXXXXXXXX</a:t>
+              <a:t>Random forest models use a number of weak learner algorithms (decision trees) and combine their output to make a final regression decision</a:t>
             </a:r>
-            <a:endParaRPr sz="1600">
+            <a:endParaRPr sz="1400">
               <a:solidFill>
                 <a:srgbClr val="000000"/>
               </a:solidFill>
@@ -12235,7 +12236,7 @@
             </a:endParaRPr>
           </a:p>
           <a:p>
-            <a:pPr indent="-330200" lvl="0" marL="457200" rtl="0" algn="l">
+            <a:pPr indent="-317500" lvl="0" marL="457200" rtl="0" algn="l">
               <a:spcBef>
                 <a:spcPts val="1000"/>
               </a:spcBef>
@@ -12245,24 +12246,94 @@
               <a:buClr>
                 <a:srgbClr val="000000"/>
               </a:buClr>
-              <a:buSzPts val="1600"/>
+              <a:buSzPts val="1400"/>
               <a:buFont typeface="Roboto"/>
               <a:buChar char="●"/>
             </a:pPr>
             <a:r>
-              <a:rPr lang="en" sz="1600">
+              <a:rPr lang="en" sz="1400">
                 <a:solidFill>
                   <a:srgbClr val="000000"/>
                 </a:solidFill>
                 <a:highlight>
-                  <a:schemeClr val="lt1"/>
+                  <a:srgbClr val="FFFFFF"/>
                 </a:highlight>
               </a:rPr>
-              <a:t>XXXXXXXXXXXXXXXXXX</a:t>
+              <a:t>Structurally speaking, random forest models are very similar to their neural network counterparts</a:t>
             </a:r>
             <a:endParaRPr sz="1400">
               <a:solidFill>
-                <a:srgbClr val="24292F"/>
+                <a:srgbClr val="000000"/>
+              </a:solidFill>
+              <a:highlight>
+                <a:srgbClr val="FFFFFF"/>
+              </a:highlight>
+            </a:endParaRPr>
+          </a:p>
+          <a:p>
+            <a:pPr indent="-317500" lvl="0" marL="457200" rtl="0" algn="l">
+              <a:spcBef>
+                <a:spcPts val="1000"/>
+              </a:spcBef>
+              <a:spcAft>
+                <a:spcPts val="0"/>
+              </a:spcAft>
+              <a:buClr>
+                <a:srgbClr val="000000"/>
+              </a:buClr>
+              <a:buSzPts val="1400"/>
+              <a:buFont typeface="Roboto"/>
+              <a:buChar char="●"/>
+            </a:pPr>
+            <a:r>
+              <a:rPr lang="en" sz="1400">
+                <a:solidFill>
+                  <a:srgbClr val="000000"/>
+                </a:solidFill>
+                <a:highlight>
+                  <a:srgbClr val="FFFFFF"/>
+                </a:highlight>
+              </a:rPr>
+              <a:t>Random forest models have been a staple in machine learning algorithms for many years due to their robustness and scalability</a:t>
+            </a:r>
+            <a:endParaRPr sz="1400">
+              <a:solidFill>
+                <a:srgbClr val="000000"/>
+              </a:solidFill>
+              <a:highlight>
+                <a:srgbClr val="FFFFFF"/>
+              </a:highlight>
+            </a:endParaRPr>
+          </a:p>
+          <a:p>
+            <a:pPr indent="-317500" lvl="0" marL="457200" rtl="0" algn="l">
+              <a:spcBef>
+                <a:spcPts val="1000"/>
+              </a:spcBef>
+              <a:spcAft>
+                <a:spcPts val="0"/>
+              </a:spcAft>
+              <a:buClr>
+                <a:srgbClr val="000000"/>
+              </a:buClr>
+              <a:buSzPts val="1400"/>
+              <a:buFont typeface="Roboto"/>
+              <a:buChar char="●"/>
+            </a:pPr>
+            <a:r>
+              <a:rPr lang="en" sz="1400">
+                <a:solidFill>
+                  <a:srgbClr val="000000"/>
+                </a:solidFill>
+                <a:highlight>
+                  <a:srgbClr val="FFFFFF"/>
+                </a:highlight>
+              </a:rPr>
+              <a:t>Both output and feature selection of random forest models are easy to interpret, and they can easily handle outliers and nonlinear data</a:t>
+            </a:r>
+            <a:endParaRPr sz="1400">
+              <a:solidFill>
+                <a:srgbClr val="000000"/>
               </a:solidFill>
               <a:highlight>
                 <a:srgbClr val="FFFFFF"/>
@@ -12331,6 +12402,54 @@
           </a:p>
         </p:txBody>
       </p:sp>
+      <p:sp>
+        <p:nvSpPr>
+          <p:cNvPr id="270" name="Google Shape;270;p29"/>
+          <p:cNvSpPr txBox="1"/>
+          <p:nvPr>
+            <p:ph idx="4294967295" type="body"/>
+          </p:nvPr>
+        </p:nvSpPr>
+        <p:spPr>
+          <a:xfrm>
+            <a:off x="742900" y="1378075"/>
+            <a:ext cx="3743400" cy="461400"/>
+          </a:xfrm>
+          <a:prstGeom prst="rect">
+            <a:avLst/>
+          </a:prstGeom>
+        </p:spPr>
+        <p:txBody>
+          <a:bodyPr anchorCtr="0" anchor="t" bIns="91425" lIns="91425" spcFirstLastPara="1" rIns="91425" wrap="square" tIns="91425">
+            <a:noAutofit/>
+          </a:bodyPr>
+          <a:lstStyle/>
+          <a:p>
+            <a:pPr indent="0" lvl="0" marL="0" rtl="0" algn="l">
+              <a:spcBef>
+                <a:spcPts val="0"/>
+              </a:spcBef>
+              <a:spcAft>
+                <a:spcPts val="0"/>
+              </a:spcAft>
+              <a:buNone/>
+            </a:pPr>
+            <a:r>
+              <a:rPr lang="en">
+                <a:solidFill>
+                  <a:schemeClr val="lt1"/>
+                </a:solidFill>
+              </a:rPr>
+              <a:t>Model Selection</a:t>
+            </a:r>
+            <a:endParaRPr>
+              <a:solidFill>
+                <a:schemeClr val="lt1"/>
+              </a:solidFill>
+            </a:endParaRPr>
+          </a:p>
+        </p:txBody>
+      </p:sp>
     </p:spTree>
   </p:cSld>
   <p:clrMapOvr>
@@ -12344,7 +12463,7 @@
   <p:cSld>
     <p:spTree>
       <p:nvGrpSpPr>
-        <p:cNvPr id="273" name="Shape 273"/>
+        <p:cNvPr id="274" name="Shape 274"/>
         <p:cNvGrpSpPr/>
         <p:nvPr/>
       </p:nvGrpSpPr>
@@ -12358,7 +12477,7 @@
       </p:grpSpPr>
       <p:sp>
         <p:nvSpPr>
-          <p:cNvPr id="274" name="Google Shape;274;p30"/>
+          <p:cNvPr id="275" name="Google Shape;275;p30"/>
           <p:cNvSpPr txBox="1"/>
           <p:nvPr>
             <p:ph type="title"/>
@@ -12398,7 +12517,7 @@
       </p:sp>
       <p:sp>
         <p:nvSpPr>
-          <p:cNvPr id="275" name="Google Shape;275;p30"/>
+          <p:cNvPr id="276" name="Google Shape;276;p30"/>
           <p:cNvSpPr txBox="1"/>
           <p:nvPr>
             <p:ph idx="4294967295" type="body"/>
@@ -12574,7 +12693,7 @@
       </p:sp>
       <p:sp>
         <p:nvSpPr>
-          <p:cNvPr id="276" name="Google Shape;276;p30"/>
+          <p:cNvPr id="277" name="Google Shape;277;p30"/>
           <p:cNvSpPr/>
           <p:nvPr/>
         </p:nvSpPr>
@@ -12617,6 +12736,54 @@
           </a:p>
         </p:txBody>
       </p:sp>
+      <p:sp>
+        <p:nvSpPr>
+          <p:cNvPr id="278" name="Google Shape;278;p30"/>
+          <p:cNvSpPr txBox="1"/>
+          <p:nvPr>
+            <p:ph idx="4294967295" type="body"/>
+          </p:nvPr>
+        </p:nvSpPr>
+        <p:spPr>
+          <a:xfrm>
+            <a:off x="742900" y="1378075"/>
+            <a:ext cx="3743400" cy="461400"/>
+          </a:xfrm>
+          <a:prstGeom prst="rect">
+            <a:avLst/>
+          </a:prstGeom>
+        </p:spPr>
+        <p:txBody>
+          <a:bodyPr anchorCtr="0" anchor="t" bIns="91425" lIns="91425" spcFirstLastPara="1" rIns="91425" wrap="square" tIns="91425">
+            <a:noAutofit/>
+          </a:bodyPr>
+          <a:lstStyle/>
+          <a:p>
+            <a:pPr indent="0" lvl="0" marL="0" rtl="0" algn="l">
+              <a:spcBef>
+                <a:spcPts val="0"/>
+              </a:spcBef>
+              <a:spcAft>
+                <a:spcPts val="0"/>
+              </a:spcAft>
+              <a:buNone/>
+            </a:pPr>
+            <a:r>
+              <a:rPr lang="en">
+                <a:solidFill>
+                  <a:schemeClr val="lt1"/>
+                </a:solidFill>
+              </a:rPr>
+              <a:t>Results</a:t>
+            </a:r>
+            <a:endParaRPr>
+              <a:solidFill>
+                <a:schemeClr val="lt1"/>
+              </a:solidFill>
+            </a:endParaRPr>
+          </a:p>
+        </p:txBody>
+      </p:sp>
     </p:spTree>
   </p:cSld>
   <p:clrMapOvr>
@@ -12630,7 +12797,7 @@
   <p:cSld>
     <p:spTree>
       <p:nvGrpSpPr>
-        <p:cNvPr id="280" name="Shape 280"/>
+        <p:cNvPr id="282" name="Shape 282"/>
         <p:cNvGrpSpPr/>
         <p:nvPr/>
       </p:nvGrpSpPr>
@@ -12644,7 +12811,7 @@
       </p:grpSpPr>
       <p:sp>
         <p:nvSpPr>
-          <p:cNvPr id="281" name="Google Shape;281;p31"/>
+          <p:cNvPr id="283" name="Google Shape;283;p31"/>
           <p:cNvSpPr txBox="1"/>
           <p:nvPr>
             <p:ph type="title"/>
@@ -12675,7 +12842,12 @@
               <a:buNone/>
             </a:pPr>
             <a:r>
-              <a:rPr lang="en"/>
+              <a:rPr lang="en" u="sng">
+                <a:solidFill>
+                  <a:schemeClr val="hlink"/>
+                </a:solidFill>
+                <a:hlinkClick r:id="rId3"/>
+              </a:rPr>
               <a:t>Creating Visualizations</a:t>
             </a:r>
             <a:endParaRPr/>
@@ -12684,14 +12856,14 @@
       </p:sp>
       <p:sp>
         <p:nvSpPr>
-          <p:cNvPr id="282" name="Google Shape;282;p31"/>
+          <p:cNvPr id="284" name="Google Shape;284;p31"/>
           <p:cNvSpPr txBox="1"/>
           <p:nvPr/>
         </p:nvSpPr>
         <p:spPr>
           <a:xfrm>
             <a:off x="562350" y="1412750"/>
-            <a:ext cx="7159800" cy="400200"/>
+            <a:ext cx="7159800" cy="431100"/>
           </a:xfrm>
           <a:prstGeom prst="rect">
             <a:avLst/>
@@ -12717,19 +12889,9 @@
               <a:buNone/>
             </a:pPr>
             <a:r>
-              <a:rPr lang="en" u="sng">
-                <a:solidFill>
-                  <a:schemeClr val="hlink"/>
-                </a:solidFill>
-                <a:latin typeface="Roboto"/>
-                <a:ea typeface="Roboto"/>
-                <a:cs typeface="Roboto"/>
-                <a:sym typeface="Roboto"/>
-                <a:hlinkClick r:id="rId3"/>
-              </a:rPr>
-              <a:t>[[LINK TO DASHBOARD]]</a:t>
+              <a:t/>
             </a:r>
-            <a:endParaRPr>
+            <a:endParaRPr sz="1600">
               <a:latin typeface="Roboto"/>
               <a:ea typeface="Roboto"/>
               <a:cs typeface="Roboto"/>
@@ -12738,6 +12900,34 @@
           </a:p>
         </p:txBody>
       </p:sp>
+      <p:pic>
+        <p:nvPicPr>
+          <p:cNvPr id="285" name="Google Shape;285;p31"/>
+          <p:cNvPicPr preferRelativeResize="0"/>
+          <p:nvPr/>
+        </p:nvPicPr>
+        <p:blipFill>
+          <a:blip r:embed="rId4">
+            <a:alphaModFix/>
+          </a:blip>
+          <a:stretch>
+            <a:fillRect/>
+          </a:stretch>
+        </p:blipFill>
+        <p:spPr>
+          <a:xfrm>
+            <a:off x="5005225" y="1705600"/>
+            <a:ext cx="2994850" cy="2994850"/>
+          </a:xfrm>
+          <a:prstGeom prst="rect">
+            <a:avLst/>
+          </a:prstGeom>
+          <a:noFill/>
+          <a:ln>
+            <a:noFill/>
+          </a:ln>
+        </p:spPr>
+      </p:pic>
     </p:spTree>
   </p:cSld>
   <p:clrMapOvr>
@@ -12797,7 +12987,7 @@
             </a:pPr>
             <a:r>
               <a:rPr lang="en"/>
-              <a:t>COVID-19 Overview</a:t>
+              <a:t>Overview</a:t>
             </a:r>
             <a:endParaRPr/>
           </a:p>
@@ -13502,7 +13692,7 @@
   <p:cSld>
     <p:spTree>
       <p:nvGrpSpPr>
-        <p:cNvPr id="286" name="Shape 286"/>
+        <p:cNvPr id="289" name="Shape 289"/>
         <p:cNvGrpSpPr/>
         <p:nvPr/>
       </p:nvGrpSpPr>
@@ -13516,7 +13706,7 @@
       </p:grpSpPr>
       <p:sp>
         <p:nvSpPr>
-          <p:cNvPr id="287" name="Google Shape;287;p32"/>
+          <p:cNvPr id="290" name="Google Shape;290;p32"/>
           <p:cNvSpPr txBox="1"/>
           <p:nvPr>
             <p:ph type="title"/>
@@ -13556,7 +13746,7 @@
       </p:sp>
       <p:grpSp>
         <p:nvGrpSpPr>
-          <p:cNvPr id="288" name="Google Shape;288;p32"/>
+          <p:cNvPr id="291" name="Google Shape;291;p32"/>
           <p:cNvGrpSpPr/>
           <p:nvPr/>
         </p:nvGrpSpPr>
@@ -13570,7 +13760,7 @@
         </p:grpSpPr>
         <p:sp>
           <p:nvSpPr>
-            <p:cNvPr id="289" name="Google Shape;289;p32"/>
+            <p:cNvPr id="292" name="Google Shape;292;p32"/>
             <p:cNvSpPr txBox="1"/>
             <p:nvPr/>
           </p:nvSpPr>
@@ -13613,7 +13803,7 @@
         </p:sp>
         <p:sp>
           <p:nvSpPr>
-            <p:cNvPr id="290" name="Google Shape;290;p32"/>
+            <p:cNvPr id="293" name="Google Shape;293;p32"/>
             <p:cNvSpPr/>
             <p:nvPr/>
           </p:nvSpPr>
@@ -13797,7 +13987,7 @@
   <p:cSld>
     <p:spTree>
       <p:nvGrpSpPr>
-        <p:cNvPr id="294" name="Shape 294"/>
+        <p:cNvPr id="297" name="Shape 297"/>
         <p:cNvGrpSpPr/>
         <p:nvPr/>
       </p:nvGrpSpPr>
@@ -13811,7 +14001,7 @@
       </p:grpSpPr>
       <p:sp>
         <p:nvSpPr>
-          <p:cNvPr id="295" name="Google Shape;295;p33"/>
+          <p:cNvPr id="298" name="Google Shape;298;p33"/>
           <p:cNvSpPr txBox="1"/>
           <p:nvPr>
             <p:ph type="title"/>
@@ -13855,7 +14045,7 @@
       </p:sp>
       <p:grpSp>
         <p:nvGrpSpPr>
-          <p:cNvPr id="296" name="Google Shape;296;p33"/>
+          <p:cNvPr id="299" name="Google Shape;299;p33"/>
           <p:cNvGrpSpPr/>
           <p:nvPr/>
         </p:nvGrpSpPr>
@@ -13869,7 +14059,7 @@
         </p:grpSpPr>
         <p:sp>
           <p:nvSpPr>
-            <p:cNvPr id="297" name="Google Shape;297;p33"/>
+            <p:cNvPr id="300" name="Google Shape;300;p33"/>
             <p:cNvSpPr txBox="1"/>
             <p:nvPr/>
           </p:nvSpPr>
@@ -13912,7 +14102,7 @@
         </p:sp>
         <p:sp>
           <p:nvSpPr>
-            <p:cNvPr id="298" name="Google Shape;298;p33"/>
+            <p:cNvPr id="301" name="Google Shape;301;p33"/>
             <p:cNvSpPr/>
             <p:nvPr/>
           </p:nvSpPr>
@@ -13953,13 +14143,22 @@
                 <a:buChar char="●"/>
               </a:pPr>
               <a:r>
+                <a:rPr b="1" lang="en" sz="1600">
+                  <a:latin typeface="Roboto"/>
+                  <a:ea typeface="Roboto"/>
+                  <a:cs typeface="Roboto"/>
+                  <a:sym typeface="Roboto"/>
+                </a:rPr>
+                <a:t>Time and Resources</a:t>
+              </a:r>
+              <a:r>
                 <a:rPr lang="en" sz="1600">
                   <a:latin typeface="Roboto"/>
                   <a:ea typeface="Roboto"/>
                   <a:cs typeface="Roboto"/>
                   <a:sym typeface="Roboto"/>
                 </a:rPr>
-                <a:t>XXXXXXXXXXXXXXXXXXXXXXXXXXX</a:t>
+                <a:t> </a:t>
               </a:r>
               <a:endParaRPr sz="1600">
                 <a:latin typeface="Roboto"/>
@@ -13987,7 +14186,7 @@
                   <a:cs typeface="Roboto"/>
                   <a:sym typeface="Roboto"/>
                 </a:rPr>
-                <a:t>XXXXXXXXXXXXXXXXXXXXX</a:t>
+                <a:t>Unable to use models to predict deaths relating to COVID-19</a:t>
               </a:r>
               <a:endParaRPr sz="1600">
                 <a:latin typeface="Roboto"/>
@@ -14015,35 +14214,7 @@
                   <a:cs typeface="Roboto"/>
                   <a:sym typeface="Roboto"/>
                 </a:rPr>
-                <a:t>XXXXXXXXXXXXXXXXXXXXXXX</a:t>
-              </a:r>
-              <a:endParaRPr sz="1600">
-                <a:latin typeface="Roboto"/>
-                <a:ea typeface="Roboto"/>
-                <a:cs typeface="Roboto"/>
-                <a:sym typeface="Roboto"/>
-              </a:endParaRPr>
-            </a:p>
-            <a:p>
-              <a:pPr indent="-330200" lvl="0" marL="457200" rtl="0" algn="l">
-                <a:spcBef>
-                  <a:spcPts val="1000"/>
-                </a:spcBef>
-                <a:spcAft>
-                  <a:spcPts val="0"/>
-                </a:spcAft>
-                <a:buSzPts val="1600"/>
-                <a:buFont typeface="Roboto"/>
-                <a:buChar char="●"/>
-              </a:pPr>
-              <a:r>
-                <a:rPr lang="en" sz="1600">
-                  <a:latin typeface="Roboto"/>
-                  <a:ea typeface="Roboto"/>
-                  <a:cs typeface="Roboto"/>
-                  <a:sym typeface="Roboto"/>
-                </a:rPr>
-                <a:t>XXXXXXXXXXXXXXXXXXXXXXXXXXXX</a:t>
+                <a:t>Unable to predict the number of cases and deaths in future populations</a:t>
               </a:r>
               <a:endParaRPr sz="1600">
                 <a:latin typeface="Roboto"/>
@@ -14085,7 +14256,7 @@
       </p:grpSp>
       <p:sp>
         <p:nvSpPr>
-          <p:cNvPr id="299" name="Google Shape;299;p33"/>
+          <p:cNvPr id="302" name="Google Shape;302;p33"/>
           <p:cNvSpPr/>
           <p:nvPr/>
         </p:nvSpPr>
@@ -14199,6 +14370,54 @@
           </a:p>
         </p:txBody>
       </p:sp>
+      <p:sp>
+        <p:nvSpPr>
+          <p:cNvPr id="303" name="Google Shape;303;p33"/>
+          <p:cNvSpPr txBox="1"/>
+          <p:nvPr>
+            <p:ph idx="4294967295" type="body"/>
+          </p:nvPr>
+        </p:nvSpPr>
+        <p:spPr>
+          <a:xfrm>
+            <a:off x="401725" y="1228675"/>
+            <a:ext cx="3743400" cy="461400"/>
+          </a:xfrm>
+          <a:prstGeom prst="rect">
+            <a:avLst/>
+          </a:prstGeom>
+        </p:spPr>
+        <p:txBody>
+          <a:bodyPr anchorCtr="0" anchor="t" bIns="91425" lIns="91425" spcFirstLastPara="1" rIns="91425" wrap="square" tIns="91425">
+            <a:noAutofit/>
+          </a:bodyPr>
+          <a:lstStyle/>
+          <a:p>
+            <a:pPr indent="0" lvl="0" marL="0" rtl="0" algn="l">
+              <a:spcBef>
+                <a:spcPts val="0"/>
+              </a:spcBef>
+              <a:spcAft>
+                <a:spcPts val="0"/>
+              </a:spcAft>
+              <a:buNone/>
+            </a:pPr>
+            <a:r>
+              <a:rPr lang="en">
+                <a:solidFill>
+                  <a:schemeClr val="lt1"/>
+                </a:solidFill>
+              </a:rPr>
+              <a:t>Limitations</a:t>
+            </a:r>
+            <a:endParaRPr>
+              <a:solidFill>
+                <a:schemeClr val="lt1"/>
+              </a:solidFill>
+            </a:endParaRPr>
+          </a:p>
+        </p:txBody>
+      </p:sp>
     </p:spTree>
   </p:cSld>
   <p:clrMapOvr>
@@ -14212,7 +14431,7 @@
   <p:cSld>
     <p:spTree>
       <p:nvGrpSpPr>
-        <p:cNvPr id="303" name="Shape 303"/>
+        <p:cNvPr id="307" name="Shape 307"/>
         <p:cNvGrpSpPr/>
         <p:nvPr/>
       </p:nvGrpSpPr>
@@ -14226,7 +14445,7 @@
       </p:grpSpPr>
       <p:sp>
         <p:nvSpPr>
-          <p:cNvPr id="304" name="Google Shape;304;p34"/>
+          <p:cNvPr id="308" name="Google Shape;308;p34"/>
           <p:cNvSpPr txBox="1"/>
           <p:nvPr>
             <p:ph type="title"/>
@@ -14351,7 +14570,7 @@
       </p:sp>
       <p:grpSp>
         <p:nvGrpSpPr>
-          <p:cNvPr id="305" name="Google Shape;305;p34"/>
+          <p:cNvPr id="309" name="Google Shape;309;p34"/>
           <p:cNvGrpSpPr/>
           <p:nvPr/>
         </p:nvGrpSpPr>
@@ -14365,7 +14584,7 @@
         </p:grpSpPr>
         <p:sp>
           <p:nvSpPr>
-            <p:cNvPr id="306" name="Google Shape;306;p34"/>
+            <p:cNvPr id="310" name="Google Shape;310;p34"/>
             <p:cNvSpPr/>
             <p:nvPr/>
           </p:nvSpPr>
@@ -14411,7 +14630,7 @@
         </p:sp>
         <p:sp>
           <p:nvSpPr>
-            <p:cNvPr id="307" name="Google Shape;307;p34"/>
+            <p:cNvPr id="311" name="Google Shape;311;p34"/>
             <p:cNvSpPr txBox="1"/>
             <p:nvPr/>
           </p:nvSpPr>
@@ -14469,7 +14688,7 @@
         </p:sp>
         <p:sp>
           <p:nvSpPr>
-            <p:cNvPr id="308" name="Google Shape;308;p34"/>
+            <p:cNvPr id="312" name="Google Shape;312;p34"/>
             <p:cNvSpPr txBox="1"/>
             <p:nvPr/>
           </p:nvSpPr>
@@ -14531,7 +14750,7 @@
       </p:grpSp>
       <p:grpSp>
         <p:nvGrpSpPr>
-          <p:cNvPr id="309" name="Google Shape;309;p34"/>
+          <p:cNvPr id="313" name="Google Shape;313;p34"/>
           <p:cNvGrpSpPr/>
           <p:nvPr/>
         </p:nvGrpSpPr>
@@ -14545,7 +14764,7 @@
         </p:grpSpPr>
         <p:sp>
           <p:nvSpPr>
-            <p:cNvPr id="310" name="Google Shape;310;p34"/>
+            <p:cNvPr id="314" name="Google Shape;314;p34"/>
             <p:cNvSpPr/>
             <p:nvPr/>
           </p:nvSpPr>
@@ -14591,7 +14810,7 @@
         </p:sp>
         <p:sp>
           <p:nvSpPr>
-            <p:cNvPr id="311" name="Google Shape;311;p34"/>
+            <p:cNvPr id="315" name="Google Shape;315;p34"/>
             <p:cNvSpPr txBox="1"/>
             <p:nvPr/>
           </p:nvSpPr>
@@ -14649,7 +14868,7 @@
         </p:sp>
         <p:sp>
           <p:nvSpPr>
-            <p:cNvPr id="312" name="Google Shape;312;p34"/>
+            <p:cNvPr id="316" name="Google Shape;316;p34"/>
             <p:cNvSpPr txBox="1"/>
             <p:nvPr/>
           </p:nvSpPr>
@@ -14711,7 +14930,7 @@
       </p:grpSp>
       <p:grpSp>
         <p:nvGrpSpPr>
-          <p:cNvPr id="313" name="Google Shape;313;p34"/>
+          <p:cNvPr id="317" name="Google Shape;317;p34"/>
           <p:cNvGrpSpPr/>
           <p:nvPr/>
         </p:nvGrpSpPr>
@@ -14725,7 +14944,7 @@
         </p:grpSpPr>
         <p:sp>
           <p:nvSpPr>
-            <p:cNvPr id="314" name="Google Shape;314;p34"/>
+            <p:cNvPr id="318" name="Google Shape;318;p34"/>
             <p:cNvSpPr/>
             <p:nvPr/>
           </p:nvSpPr>
@@ -14816,7 +15035,7 @@
         </p:sp>
         <p:sp>
           <p:nvSpPr>
-            <p:cNvPr id="315" name="Google Shape;315;p34"/>
+            <p:cNvPr id="319" name="Google Shape;319;p34"/>
             <p:cNvSpPr txBox="1"/>
             <p:nvPr/>
           </p:nvSpPr>
@@ -14886,7 +15105,7 @@
         </p:sp>
         <p:sp>
           <p:nvSpPr>
-            <p:cNvPr id="316" name="Google Shape;316;p34"/>
+            <p:cNvPr id="320" name="Google Shape;320;p34"/>
             <p:cNvSpPr txBox="1"/>
             <p:nvPr/>
           </p:nvSpPr>
@@ -14959,7 +15178,7 @@
   <p:cSld>
     <p:spTree>
       <p:nvGrpSpPr>
-        <p:cNvPr id="320" name="Shape 320"/>
+        <p:cNvPr id="324" name="Shape 324"/>
         <p:cNvGrpSpPr/>
         <p:nvPr/>
       </p:nvGrpSpPr>
@@ -14973,7 +15192,7 @@
       </p:grpSpPr>
       <p:grpSp>
         <p:nvGrpSpPr>
-          <p:cNvPr id="321" name="Google Shape;321;p35"/>
+          <p:cNvPr id="325" name="Google Shape;325;p35"/>
           <p:cNvGrpSpPr/>
           <p:nvPr/>
         </p:nvGrpSpPr>
@@ -14987,7 +15206,7 @@
         </p:grpSpPr>
         <p:cxnSp>
           <p:nvCxnSpPr>
-            <p:cNvPr id="322" name="Google Shape;322;p35"/>
+            <p:cNvPr id="326" name="Google Shape;326;p35"/>
             <p:cNvCxnSpPr/>
             <p:nvPr/>
           </p:nvCxnSpPr>
@@ -15013,7 +15232,7 @@
         </p:cxnSp>
         <p:cxnSp>
           <p:nvCxnSpPr>
-            <p:cNvPr id="323" name="Google Shape;323;p35"/>
+            <p:cNvPr id="327" name="Google Shape;327;p35"/>
             <p:cNvCxnSpPr/>
             <p:nvPr/>
           </p:nvCxnSpPr>
@@ -15039,7 +15258,7 @@
         </p:cxnSp>
         <p:cxnSp>
           <p:nvCxnSpPr>
-            <p:cNvPr id="324" name="Google Shape;324;p35"/>
+            <p:cNvPr id="328" name="Google Shape;328;p35"/>
             <p:cNvCxnSpPr/>
             <p:nvPr/>
           </p:nvCxnSpPr>
@@ -15065,7 +15284,7 @@
         </p:cxnSp>
         <p:cxnSp>
           <p:nvCxnSpPr>
-            <p:cNvPr id="325" name="Google Shape;325;p35"/>
+            <p:cNvPr id="329" name="Google Shape;329;p35"/>
             <p:cNvCxnSpPr/>
             <p:nvPr/>
           </p:nvCxnSpPr>
@@ -15091,7 +15310,7 @@
         </p:cxnSp>
         <p:cxnSp>
           <p:nvCxnSpPr>
-            <p:cNvPr id="326" name="Google Shape;326;p35"/>
+            <p:cNvPr id="330" name="Google Shape;330;p35"/>
             <p:cNvCxnSpPr/>
             <p:nvPr/>
           </p:nvCxnSpPr>
@@ -15117,7 +15336,7 @@
         </p:cxnSp>
         <p:cxnSp>
           <p:nvCxnSpPr>
-            <p:cNvPr id="327" name="Google Shape;327;p35"/>
+            <p:cNvPr id="331" name="Google Shape;331;p35"/>
             <p:cNvCxnSpPr/>
             <p:nvPr/>
           </p:nvCxnSpPr>
@@ -15143,7 +15362,7 @@
         </p:cxnSp>
         <p:cxnSp>
           <p:nvCxnSpPr>
-            <p:cNvPr id="328" name="Google Shape;328;p35"/>
+            <p:cNvPr id="332" name="Google Shape;332;p35"/>
             <p:cNvCxnSpPr/>
             <p:nvPr/>
           </p:nvCxnSpPr>
@@ -15169,7 +15388,7 @@
         </p:cxnSp>
         <p:cxnSp>
           <p:nvCxnSpPr>
-            <p:cNvPr id="329" name="Google Shape;329;p35"/>
+            <p:cNvPr id="333" name="Google Shape;333;p35"/>
             <p:cNvCxnSpPr/>
             <p:nvPr/>
           </p:nvCxnSpPr>
@@ -15195,7 +15414,7 @@
         </p:cxnSp>
         <p:cxnSp>
           <p:nvCxnSpPr>
-            <p:cNvPr id="330" name="Google Shape;330;p35"/>
+            <p:cNvPr id="334" name="Google Shape;334;p35"/>
             <p:cNvCxnSpPr/>
             <p:nvPr/>
           </p:nvCxnSpPr>
@@ -15221,7 +15440,7 @@
         </p:cxnSp>
         <p:cxnSp>
           <p:nvCxnSpPr>
-            <p:cNvPr id="331" name="Google Shape;331;p35"/>
+            <p:cNvPr id="335" name="Google Shape;335;p35"/>
             <p:cNvCxnSpPr/>
             <p:nvPr/>
           </p:nvCxnSpPr>
@@ -15248,7 +15467,7 @@
       </p:grpSp>
       <p:sp>
         <p:nvSpPr>
-          <p:cNvPr id="332" name="Google Shape;332;p35"/>
+          <p:cNvPr id="336" name="Google Shape;336;p35"/>
           <p:cNvSpPr txBox="1"/>
           <p:nvPr>
             <p:ph type="title"/>
@@ -15288,7 +15507,7 @@
       </p:sp>
       <p:grpSp>
         <p:nvGrpSpPr>
-          <p:cNvPr id="333" name="Google Shape;333;p35"/>
+          <p:cNvPr id="337" name="Google Shape;337;p35"/>
           <p:cNvGrpSpPr/>
           <p:nvPr/>
         </p:nvGrpSpPr>
@@ -15302,7 +15521,7 @@
         </p:grpSpPr>
         <p:sp>
           <p:nvSpPr>
-            <p:cNvPr id="334" name="Google Shape;334;p35"/>
+            <p:cNvPr id="338" name="Google Shape;338;p35"/>
             <p:cNvSpPr/>
             <p:nvPr/>
           </p:nvSpPr>
@@ -15380,7 +15599,7 @@
         </p:sp>
         <p:sp>
           <p:nvSpPr>
-            <p:cNvPr id="335" name="Google Shape;335;p35"/>
+            <p:cNvPr id="339" name="Google Shape;339;p35"/>
             <p:cNvSpPr/>
             <p:nvPr/>
           </p:nvSpPr>
@@ -15429,7 +15648,7 @@
         </p:sp>
         <p:sp>
           <p:nvSpPr>
-            <p:cNvPr id="336" name="Google Shape;336;p35"/>
+            <p:cNvPr id="340" name="Google Shape;340;p35"/>
             <p:cNvSpPr/>
             <p:nvPr/>
           </p:nvSpPr>
@@ -15478,7 +15697,7 @@
         </p:sp>
         <p:sp>
           <p:nvSpPr>
-            <p:cNvPr id="337" name="Google Shape;337;p35"/>
+            <p:cNvPr id="341" name="Google Shape;341;p35"/>
             <p:cNvSpPr/>
             <p:nvPr/>
           </p:nvSpPr>
@@ -15527,7 +15746,7 @@
         </p:sp>
         <p:sp>
           <p:nvSpPr>
-            <p:cNvPr id="338" name="Google Shape;338;p35"/>
+            <p:cNvPr id="342" name="Google Shape;342;p35"/>
             <p:cNvSpPr/>
             <p:nvPr/>
           </p:nvSpPr>
@@ -15576,7 +15795,7 @@
         </p:sp>
         <p:sp>
           <p:nvSpPr>
-            <p:cNvPr id="339" name="Google Shape;339;p35"/>
+            <p:cNvPr id="343" name="Google Shape;343;p35"/>
             <p:cNvSpPr/>
             <p:nvPr/>
           </p:nvSpPr>
@@ -15625,7 +15844,7 @@
         </p:sp>
         <p:sp>
           <p:nvSpPr>
-            <p:cNvPr id="340" name="Google Shape;340;p35"/>
+            <p:cNvPr id="344" name="Google Shape;344;p35"/>
             <p:cNvSpPr/>
             <p:nvPr/>
           </p:nvSpPr>
@@ -15674,7 +15893,7 @@
         </p:sp>
         <p:sp>
           <p:nvSpPr>
-            <p:cNvPr id="341" name="Google Shape;341;p35"/>
+            <p:cNvPr id="345" name="Google Shape;345;p35"/>
             <p:cNvSpPr/>
             <p:nvPr/>
           </p:nvSpPr>
@@ -15723,7 +15942,7 @@
         </p:sp>
         <p:sp>
           <p:nvSpPr>
-            <p:cNvPr id="342" name="Google Shape;342;p35"/>
+            <p:cNvPr id="346" name="Google Shape;346;p35"/>
             <p:cNvSpPr/>
             <p:nvPr/>
           </p:nvSpPr>
@@ -15773,7 +15992,7 @@
       </p:grpSp>
       <p:grpSp>
         <p:nvGrpSpPr>
-          <p:cNvPr id="343" name="Google Shape;343;p35"/>
+          <p:cNvPr id="347" name="Google Shape;347;p35"/>
           <p:cNvGrpSpPr/>
           <p:nvPr/>
         </p:nvGrpSpPr>
@@ -15787,7 +16006,7 @@
         </p:grpSpPr>
         <p:sp>
           <p:nvSpPr>
-            <p:cNvPr id="344" name="Google Shape;344;p35"/>
+            <p:cNvPr id="348" name="Google Shape;348;p35"/>
             <p:cNvSpPr/>
             <p:nvPr/>
           </p:nvSpPr>
@@ -15865,7 +16084,7 @@
         </p:sp>
         <p:sp>
           <p:nvSpPr>
-            <p:cNvPr id="345" name="Google Shape;345;p35"/>
+            <p:cNvPr id="349" name="Google Shape;349;p35"/>
             <p:cNvSpPr/>
             <p:nvPr/>
           </p:nvSpPr>
@@ -15914,7 +16133,7 @@
         </p:sp>
         <p:sp>
           <p:nvSpPr>
-            <p:cNvPr id="346" name="Google Shape;346;p35"/>
+            <p:cNvPr id="350" name="Google Shape;350;p35"/>
             <p:cNvSpPr/>
             <p:nvPr/>
           </p:nvSpPr>
@@ -15963,7 +16182,7 @@
         </p:sp>
         <p:sp>
           <p:nvSpPr>
-            <p:cNvPr id="347" name="Google Shape;347;p35"/>
+            <p:cNvPr id="351" name="Google Shape;351;p35"/>
             <p:cNvSpPr/>
             <p:nvPr/>
           </p:nvSpPr>
@@ -16012,7 +16231,7 @@
         </p:sp>
         <p:sp>
           <p:nvSpPr>
-            <p:cNvPr id="348" name="Google Shape;348;p35"/>
+            <p:cNvPr id="352" name="Google Shape;352;p35"/>
             <p:cNvSpPr/>
             <p:nvPr/>
           </p:nvSpPr>
@@ -16061,7 +16280,7 @@
         </p:sp>
         <p:sp>
           <p:nvSpPr>
-            <p:cNvPr id="349" name="Google Shape;349;p35"/>
+            <p:cNvPr id="353" name="Google Shape;353;p35"/>
             <p:cNvSpPr/>
             <p:nvPr/>
           </p:nvSpPr>
@@ -16110,7 +16329,7 @@
         </p:sp>
         <p:sp>
           <p:nvSpPr>
-            <p:cNvPr id="350" name="Google Shape;350;p35"/>
+            <p:cNvPr id="354" name="Google Shape;354;p35"/>
             <p:cNvSpPr/>
             <p:nvPr/>
           </p:nvSpPr>
@@ -16159,7 +16378,7 @@
         </p:sp>
         <p:sp>
           <p:nvSpPr>
-            <p:cNvPr id="351" name="Google Shape;351;p35"/>
+            <p:cNvPr id="355" name="Google Shape;355;p35"/>
             <p:cNvSpPr/>
             <p:nvPr/>
           </p:nvSpPr>
@@ -16208,7 +16427,7 @@
         </p:sp>
         <p:sp>
           <p:nvSpPr>
-            <p:cNvPr id="352" name="Google Shape;352;p35"/>
+            <p:cNvPr id="356" name="Google Shape;356;p35"/>
             <p:cNvSpPr/>
             <p:nvPr/>
           </p:nvSpPr>
@@ -16258,7 +16477,7 @@
       </p:grpSp>
       <p:sp>
         <p:nvSpPr>
-          <p:cNvPr id="353" name="Google Shape;353;p35"/>
+          <p:cNvPr id="357" name="Google Shape;357;p35"/>
           <p:cNvSpPr txBox="1"/>
           <p:nvPr>
             <p:ph idx="2" type="body"/>
@@ -16317,7 +16536,7 @@
   <p:cSld>
     <p:spTree>
       <p:nvGrpSpPr>
-        <p:cNvPr id="357" name="Shape 357"/>
+        <p:cNvPr id="361" name="Shape 361"/>
         <p:cNvGrpSpPr/>
         <p:nvPr/>
       </p:nvGrpSpPr>
@@ -16331,7 +16550,7 @@
       </p:grpSpPr>
       <p:sp>
         <p:nvSpPr>
-          <p:cNvPr id="358" name="Google Shape;358;p36"/>
+          <p:cNvPr id="362" name="Google Shape;362;p36"/>
           <p:cNvSpPr txBox="1"/>
           <p:nvPr/>
         </p:nvSpPr>
@@ -16622,7 +16841,7 @@
       </p:sp>
       <p:sp>
         <p:nvSpPr>
-          <p:cNvPr id="359" name="Google Shape;359;p36"/>
+          <p:cNvPr id="363" name="Google Shape;363;p36"/>
           <p:cNvSpPr txBox="1"/>
           <p:nvPr>
             <p:ph idx="4294967295" type="title"/>
@@ -17375,7 +17594,7 @@
                   <a:srgbClr val="FFFFFF"/>
                 </a:highlight>
               </a:rPr>
-              <a:t> at </a:t>
+              <a:t> on OWID’s GitHub </a:t>
             </a:r>
             <a:r>
               <a:rPr lang="en" sz="1400" u="sng">
@@ -17631,7 +17850,7 @@
                   <a:schemeClr val="lt1"/>
                 </a:highlight>
               </a:rPr>
-              <a:t> including country, COVID-19 cases, COVID-19 deaths, vaccinations, population, and several other factors in reference to the COVID-19 pandemic</a:t>
+              <a:t> including country, COVID-19 cases, COVID-19 deaths, vaccinations, population, and several other socioeconomic factors </a:t>
             </a:r>
             <a:endParaRPr sz="1400">
               <a:solidFill>
@@ -18107,7 +18326,7 @@
                 <a:cs typeface="Roboto"/>
                 <a:sym typeface="Roboto"/>
               </a:rPr>
-              <a:t>Compare the accuracy of predicting new cases with regression and </a:t>
+              <a:t>Compare the accuracy of predicting new cases with a regression model and </a:t>
             </a:r>
             <a:r>
               <a:rPr lang="en">
@@ -21162,6 +21381,285 @@
 </file>
 
 <file path=ppt/theme/theme1.xml><?xml version="1.0" encoding="utf-8"?>
+<a:theme xmlns:a="http://schemas.openxmlformats.org/drawingml/2006/main" xmlns:r="http://schemas.openxmlformats.org/officeDocument/2006/relationships" name="Geometric">
+  <a:themeElements>
+    <a:clrScheme name="Geometric">
+      <a:dk1>
+        <a:srgbClr val="2A3990"/>
+      </a:dk1>
+      <a:lt1>
+        <a:srgbClr val="FFFFFF"/>
+      </a:lt1>
+      <a:dk2>
+        <a:srgbClr val="434343"/>
+      </a:dk2>
+      <a:lt2>
+        <a:srgbClr val="999999"/>
+      </a:lt2>
+      <a:accent1>
+        <a:srgbClr val="212D74"/>
+      </a:accent1>
+      <a:accent2>
+        <a:srgbClr val="3949AB"/>
+      </a:accent2>
+      <a:accent3>
+        <a:srgbClr val="9C254D"/>
+      </a:accent3>
+      <a:accent4>
+        <a:srgbClr val="D23369"/>
+      </a:accent4>
+      <a:accent5>
+        <a:srgbClr val="F06292"/>
+      </a:accent5>
+      <a:accent6>
+        <a:srgbClr val="7890CD"/>
+      </a:accent6>
+      <a:hlink>
+        <a:srgbClr val="F06292"/>
+      </a:hlink>
+      <a:folHlink>
+        <a:srgbClr val="F06292"/>
+      </a:folHlink>
+    </a:clrScheme>
+    <a:fontScheme name="Office">
+      <a:majorFont>
+        <a:latin typeface="Arial"/>
+        <a:ea typeface=""/>
+        <a:cs typeface=""/>
+        <a:font script="Jpan" typeface="ＭＳ Ｐゴシック"/>
+        <a:font script="Hang" typeface="맑은 고딕"/>
+        <a:font script="Hans" typeface="宋体"/>
+        <a:font script="Hant" typeface="新細明體"/>
+        <a:font script="Arab" typeface="Times New Roman"/>
+        <a:font script="Hebr" typeface="Times New Roman"/>
+        <a:font script="Thai" typeface="Angsana New"/>
+        <a:font script="Ethi" typeface="Nyala"/>
+        <a:font script="Beng" typeface="Vrinda"/>
+        <a:font script="Gujr" typeface="Shruti"/>
+        <a:font script="Khmr" typeface="MoolBoran"/>
+        <a:font script="Knda" typeface="Tunga"/>
+        <a:font script="Guru" typeface="Raavi"/>
+        <a:font script="Cans" typeface="Euphemia"/>
+        <a:font script="Cher" typeface="Plantagenet Cherokee"/>
+        <a:font script="Yiii" typeface="Microsoft Yi Baiti"/>
+        <a:font script="Tibt" typeface="Microsoft Himalaya"/>
+        <a:font script="Thaa" typeface="MV Boli"/>
+        <a:font script="Deva" typeface="Mangal"/>
+        <a:font script="Telu" typeface="Gautami"/>
+        <a:font script="Taml" typeface="Latha"/>
+        <a:font script="Syrc" typeface="Estrangelo Edessa"/>
+        <a:font script="Orya" typeface="Kalinga"/>
+        <a:font script="Mlym" typeface="Kartika"/>
+        <a:font script="Laoo" typeface="DokChampa"/>
+        <a:font script="Sinh" typeface="Iskoola Pota"/>
+        <a:font script="Mong" typeface="Mongolian Baiti"/>
+        <a:font script="Viet" typeface="Times New Roman"/>
+        <a:font script="Uigh" typeface="Microsoft Uighur"/>
+        <a:font script="Geor" typeface="Sylfaen"/>
+      </a:majorFont>
+      <a:minorFont>
+        <a:latin typeface="Arial"/>
+        <a:ea typeface=""/>
+        <a:cs typeface=""/>
+        <a:font script="Jpan" typeface="ＭＳ Ｐゴシック"/>
+        <a:font script="Hang" typeface="맑은 고딕"/>
+        <a:font script="Hans" typeface="宋体"/>
+        <a:font script="Hant" typeface="新細明體"/>
+        <a:font script="Arab" typeface="Arial"/>
+        <a:font script="Hebr" typeface="Arial"/>
+        <a:font script="Thai" typeface="Cordia New"/>
+        <a:font script="Ethi" typeface="Nyala"/>
+        <a:font script="Beng" typeface="Vrinda"/>
+        <a:font script="Gujr" typeface="Shruti"/>
+        <a:font script="Khmr" typeface="DaunPenh"/>
+        <a:font script="Knda" typeface="Tunga"/>
+        <a:font script="Guru" typeface="Raavi"/>
+        <a:font script="Cans" typeface="Euphemia"/>
+        <a:font script="Cher" typeface="Plantagenet Cherokee"/>
+        <a:font script="Yiii" typeface="Microsoft Yi Baiti"/>
+        <a:font script="Tibt" typeface="Microsoft Himalaya"/>
+        <a:font script="Thaa" typeface="MV Boli"/>
+        <a:font script="Deva" typeface="Mangal"/>
+        <a:font script="Telu" typeface="Gautami"/>
+        <a:font script="Taml" typeface="Latha"/>
+        <a:font script="Syrc" typeface="Estrangelo Edessa"/>
+        <a:font script="Orya" typeface="Kalinga"/>
+        <a:font script="Mlym" typeface="Kartika"/>
+        <a:font script="Laoo" typeface="DokChampa"/>
+        <a:font script="Sinh" typeface="Iskoola Pota"/>
+        <a:font script="Mong" typeface="Mongolian Baiti"/>
+        <a:font script="Viet" typeface="Arial"/>
+        <a:font script="Uigh" typeface="Microsoft Uighur"/>
+        <a:font script="Geor" typeface="Sylfaen"/>
+      </a:minorFont>
+    </a:fontScheme>
+    <a:fmtScheme name="Office">
+      <a:fillStyleLst>
+        <a:solidFill>
+          <a:schemeClr val="phClr"/>
+        </a:solidFill>
+        <a:gradFill rotWithShape="1">
+          <a:gsLst>
+            <a:gs pos="0">
+              <a:schemeClr val="phClr">
+                <a:tint val="50000"/>
+                <a:satMod val="300000"/>
+              </a:schemeClr>
+            </a:gs>
+            <a:gs pos="35000">
+              <a:schemeClr val="phClr">
+                <a:tint val="37000"/>
+                <a:satMod val="300000"/>
+              </a:schemeClr>
+            </a:gs>
+            <a:gs pos="100000">
+              <a:schemeClr val="phClr">
+                <a:tint val="15000"/>
+                <a:satMod val="350000"/>
+              </a:schemeClr>
+            </a:gs>
+          </a:gsLst>
+          <a:lin ang="16200000" scaled="1"/>
+        </a:gradFill>
+        <a:gradFill rotWithShape="1">
+          <a:gsLst>
+            <a:gs pos="0">
+              <a:schemeClr val="phClr">
+                <a:tint val="100000"/>
+                <a:shade val="100000"/>
+                <a:satMod val="130000"/>
+              </a:schemeClr>
+            </a:gs>
+            <a:gs pos="100000">
+              <a:schemeClr val="phClr">
+                <a:tint val="50000"/>
+                <a:shade val="100000"/>
+                <a:satMod val="350000"/>
+              </a:schemeClr>
+            </a:gs>
+          </a:gsLst>
+          <a:lin ang="16200000" scaled="0"/>
+        </a:gradFill>
+      </a:fillStyleLst>
+      <a:lnStyleLst>
+        <a:ln w="9525" cap="flat" cmpd="sng" algn="ctr">
+          <a:solidFill>
+            <a:schemeClr val="phClr">
+              <a:shade val="95000"/>
+              <a:satMod val="105000"/>
+            </a:schemeClr>
+          </a:solidFill>
+          <a:prstDash val="solid"/>
+        </a:ln>
+        <a:ln w="25400" cap="flat" cmpd="sng" algn="ctr">
+          <a:solidFill>
+            <a:schemeClr val="phClr"/>
+          </a:solidFill>
+          <a:prstDash val="solid"/>
+        </a:ln>
+        <a:ln w="38100" cap="flat" cmpd="sng" algn="ctr">
+          <a:solidFill>
+            <a:schemeClr val="phClr"/>
+          </a:solidFill>
+          <a:prstDash val="solid"/>
+        </a:ln>
+      </a:lnStyleLst>
+      <a:effectStyleLst>
+        <a:effectStyle>
+          <a:effectLst>
+            <a:outerShdw blurRad="40000" dist="20000" dir="5400000" rotWithShape="0">
+              <a:srgbClr val="000000">
+                <a:alpha val="38000"/>
+              </a:srgbClr>
+            </a:outerShdw>
+          </a:effectLst>
+        </a:effectStyle>
+        <a:effectStyle>
+          <a:effectLst>
+            <a:outerShdw blurRad="40000" dist="23000" dir="5400000" rotWithShape="0">
+              <a:srgbClr val="000000">
+                <a:alpha val="35000"/>
+              </a:srgbClr>
+            </a:outerShdw>
+          </a:effectLst>
+        </a:effectStyle>
+        <a:effectStyle>
+          <a:effectLst>
+            <a:outerShdw blurRad="40000" dist="23000" dir="5400000" rotWithShape="0">
+              <a:srgbClr val="000000">
+                <a:alpha val="35000"/>
+              </a:srgbClr>
+            </a:outerShdw>
+          </a:effectLst>
+          <a:scene3d>
+            <a:camera prst="orthographicFront">
+              <a:rot lat="0" lon="0" rev="0"/>
+            </a:camera>
+            <a:lightRig rig="threePt" dir="t">
+              <a:rot lat="0" lon="0" rev="1200000"/>
+            </a:lightRig>
+          </a:scene3d>
+          <a:sp3d>
+            <a:bevelT w="63500" h="25400"/>
+          </a:sp3d>
+        </a:effectStyle>
+      </a:effectStyleLst>
+      <a:bgFillStyleLst>
+        <a:solidFill>
+          <a:schemeClr val="phClr"/>
+        </a:solidFill>
+        <a:gradFill rotWithShape="1">
+          <a:gsLst>
+            <a:gs pos="0">
+              <a:schemeClr val="phClr">
+                <a:tint val="40000"/>
+                <a:satMod val="350000"/>
+              </a:schemeClr>
+            </a:gs>
+            <a:gs pos="40000">
+              <a:schemeClr val="phClr">
+                <a:tint val="45000"/>
+                <a:shade val="99000"/>
+                <a:satMod val="350000"/>
+              </a:schemeClr>
+            </a:gs>
+            <a:gs pos="100000">
+              <a:schemeClr val="phClr">
+                <a:shade val="20000"/>
+                <a:satMod val="255000"/>
+              </a:schemeClr>
+            </a:gs>
+          </a:gsLst>
+          <a:path path="circle">
+            <a:fillToRect l="50000" t="-80000" r="50000" b="180000"/>
+          </a:path>
+        </a:gradFill>
+        <a:gradFill rotWithShape="1">
+          <a:gsLst>
+            <a:gs pos="0">
+              <a:schemeClr val="phClr">
+                <a:tint val="80000"/>
+                <a:satMod val="300000"/>
+              </a:schemeClr>
+            </a:gs>
+            <a:gs pos="100000">
+              <a:schemeClr val="phClr">
+                <a:shade val="30000"/>
+                <a:satMod val="200000"/>
+              </a:schemeClr>
+            </a:gs>
+          </a:gsLst>
+          <a:path path="circle">
+            <a:fillToRect l="50000" t="50000" r="50000" b="50000"/>
+          </a:path>
+        </a:gradFill>
+      </a:bgFillStyleLst>
+    </a:fmtScheme>
+  </a:themeElements>
+</a:theme>
+</file>
+
+<file path=ppt/theme/theme2.xml><?xml version="1.0" encoding="utf-8"?>
 <a:theme xmlns:a="http://schemas.openxmlformats.org/drawingml/2006/main" xmlns:r="http://schemas.openxmlformats.org/officeDocument/2006/relationships">
   <a:themeElements>
     <a:clrScheme name="Default">
@@ -21438,283 +21936,4 @@
     </a:fmtScheme>
   </a:themeElements>
 </a:theme>
-</file>
-
-<file path=ppt/theme/theme2.xml><?xml version="1.0" encoding="utf-8"?>
-<a:theme xmlns:a="http://schemas.openxmlformats.org/drawingml/2006/main" xmlns:r="http://schemas.openxmlformats.org/officeDocument/2006/relationships" name="Geometric">
-  <a:themeElements>
-    <a:clrScheme name="Geometric">
-      <a:dk1>
-        <a:srgbClr val="2A3990"/>
-      </a:dk1>
-      <a:lt1>
-        <a:srgbClr val="FFFFFF"/>
-      </a:lt1>
-      <a:dk2>
-        <a:srgbClr val="434343"/>
-      </a:dk2>
-      <a:lt2>
-        <a:srgbClr val="999999"/>
-      </a:lt2>
-      <a:accent1>
-        <a:srgbClr val="212D74"/>
-      </a:accent1>
-      <a:accent2>
-        <a:srgbClr val="3949AB"/>
-      </a:accent2>
-      <a:accent3>
-        <a:srgbClr val="9C254D"/>
-      </a:accent3>
-      <a:accent4>
-        <a:srgbClr val="D23369"/>
-      </a:accent4>
-      <a:accent5>
-        <a:srgbClr val="F06292"/>
-      </a:accent5>
-      <a:accent6>
-        <a:srgbClr val="7890CD"/>
-      </a:accent6>
-      <a:hlink>
-        <a:srgbClr val="F06292"/>
-      </a:hlink>
-      <a:folHlink>
-        <a:srgbClr val="F06292"/>
-      </a:folHlink>
-    </a:clrScheme>
-    <a:fontScheme name="Office">
-      <a:majorFont>
-        <a:latin typeface="Arial"/>
-        <a:ea typeface=""/>
-        <a:cs typeface=""/>
-        <a:font script="Jpan" typeface="ＭＳ Ｐゴシック"/>
-        <a:font script="Hang" typeface="맑은 고딕"/>
-        <a:font script="Hans" typeface="宋体"/>
-        <a:font script="Hant" typeface="新細明體"/>
-        <a:font script="Arab" typeface="Times New Roman"/>
-        <a:font script="Hebr" typeface="Times New Roman"/>
-        <a:font script="Thai" typeface="Angsana New"/>
-        <a:font script="Ethi" typeface="Nyala"/>
-        <a:font script="Beng" typeface="Vrinda"/>
-        <a:font script="Gujr" typeface="Shruti"/>
-        <a:font script="Khmr" typeface="MoolBoran"/>
-        <a:font script="Knda" typeface="Tunga"/>
-        <a:font script="Guru" typeface="Raavi"/>
-        <a:font script="Cans" typeface="Euphemia"/>
-        <a:font script="Cher" typeface="Plantagenet Cherokee"/>
-        <a:font script="Yiii" typeface="Microsoft Yi Baiti"/>
-        <a:font script="Tibt" typeface="Microsoft Himalaya"/>
-        <a:font script="Thaa" typeface="MV Boli"/>
-        <a:font script="Deva" typeface="Mangal"/>
-        <a:font script="Telu" typeface="Gautami"/>
-        <a:font script="Taml" typeface="Latha"/>
-        <a:font script="Syrc" typeface="Estrangelo Edessa"/>
-        <a:font script="Orya" typeface="Kalinga"/>
-        <a:font script="Mlym" typeface="Kartika"/>
-        <a:font script="Laoo" typeface="DokChampa"/>
-        <a:font script="Sinh" typeface="Iskoola Pota"/>
-        <a:font script="Mong" typeface="Mongolian Baiti"/>
-        <a:font script="Viet" typeface="Times New Roman"/>
-        <a:font script="Uigh" typeface="Microsoft Uighur"/>
-        <a:font script="Geor" typeface="Sylfaen"/>
-      </a:majorFont>
-      <a:minorFont>
-        <a:latin typeface="Arial"/>
-        <a:ea typeface=""/>
-        <a:cs typeface=""/>
-        <a:font script="Jpan" typeface="ＭＳ Ｐゴシック"/>
-        <a:font script="Hang" typeface="맑은 고딕"/>
-        <a:font script="Hans" typeface="宋体"/>
-        <a:font script="Hant" typeface="新細明體"/>
-        <a:font script="Arab" typeface="Arial"/>
-        <a:font script="Hebr" typeface="Arial"/>
-        <a:font script="Thai" typeface="Cordia New"/>
-        <a:font script="Ethi" typeface="Nyala"/>
-        <a:font script="Beng" typeface="Vrinda"/>
-        <a:font script="Gujr" typeface="Shruti"/>
-        <a:font script="Khmr" typeface="DaunPenh"/>
-        <a:font script="Knda" typeface="Tunga"/>
-        <a:font script="Guru" typeface="Raavi"/>
-        <a:font script="Cans" typeface="Euphemia"/>
-        <a:font script="Cher" typeface="Plantagenet Cherokee"/>
-        <a:font script="Yiii" typeface="Microsoft Yi Baiti"/>
-        <a:font script="Tibt" typeface="Microsoft Himalaya"/>
-        <a:font script="Thaa" typeface="MV Boli"/>
-        <a:font script="Deva" typeface="Mangal"/>
-        <a:font script="Telu" typeface="Gautami"/>
-        <a:font script="Taml" typeface="Latha"/>
-        <a:font script="Syrc" typeface="Estrangelo Edessa"/>
-        <a:font script="Orya" typeface="Kalinga"/>
-        <a:font script="Mlym" typeface="Kartika"/>
-        <a:font script="Laoo" typeface="DokChampa"/>
-        <a:font script="Sinh" typeface="Iskoola Pota"/>
-        <a:font script="Mong" typeface="Mongolian Baiti"/>
-        <a:font script="Viet" typeface="Arial"/>
-        <a:font script="Uigh" typeface="Microsoft Uighur"/>
-        <a:font script="Geor" typeface="Sylfaen"/>
-      </a:minorFont>
-    </a:fontScheme>
-    <a:fmtScheme name="Office">
-      <a:fillStyleLst>
-        <a:solidFill>
-          <a:schemeClr val="phClr"/>
-        </a:solidFill>
-        <a:gradFill rotWithShape="1">
-          <a:gsLst>
-            <a:gs pos="0">
-              <a:schemeClr val="phClr">
-                <a:tint val="50000"/>
-                <a:satMod val="300000"/>
-              </a:schemeClr>
-            </a:gs>
-            <a:gs pos="35000">
-              <a:schemeClr val="phClr">
-                <a:tint val="37000"/>
-                <a:satMod val="300000"/>
-              </a:schemeClr>
-            </a:gs>
-            <a:gs pos="100000">
-              <a:schemeClr val="phClr">
-                <a:tint val="15000"/>
-                <a:satMod val="350000"/>
-              </a:schemeClr>
-            </a:gs>
-          </a:gsLst>
-          <a:lin ang="16200000" scaled="1"/>
-        </a:gradFill>
-        <a:gradFill rotWithShape="1">
-          <a:gsLst>
-            <a:gs pos="0">
-              <a:schemeClr val="phClr">
-                <a:tint val="100000"/>
-                <a:shade val="100000"/>
-                <a:satMod val="130000"/>
-              </a:schemeClr>
-            </a:gs>
-            <a:gs pos="100000">
-              <a:schemeClr val="phClr">
-                <a:tint val="50000"/>
-                <a:shade val="100000"/>
-                <a:satMod val="350000"/>
-              </a:schemeClr>
-            </a:gs>
-          </a:gsLst>
-          <a:lin ang="16200000" scaled="0"/>
-        </a:gradFill>
-      </a:fillStyleLst>
-      <a:lnStyleLst>
-        <a:ln w="9525" cap="flat" cmpd="sng" algn="ctr">
-          <a:solidFill>
-            <a:schemeClr val="phClr">
-              <a:shade val="95000"/>
-              <a:satMod val="105000"/>
-            </a:schemeClr>
-          </a:solidFill>
-          <a:prstDash val="solid"/>
-        </a:ln>
-        <a:ln w="25400" cap="flat" cmpd="sng" algn="ctr">
-          <a:solidFill>
-            <a:schemeClr val="phClr"/>
-          </a:solidFill>
-          <a:prstDash val="solid"/>
-        </a:ln>
-        <a:ln w="38100" cap="flat" cmpd="sng" algn="ctr">
-          <a:solidFill>
-            <a:schemeClr val="phClr"/>
-          </a:solidFill>
-          <a:prstDash val="solid"/>
-        </a:ln>
-      </a:lnStyleLst>
-      <a:effectStyleLst>
-        <a:effectStyle>
-          <a:effectLst>
-            <a:outerShdw blurRad="40000" dist="20000" dir="5400000" rotWithShape="0">
-              <a:srgbClr val="000000">
-                <a:alpha val="38000"/>
-              </a:srgbClr>
-            </a:outerShdw>
-          </a:effectLst>
-        </a:effectStyle>
-        <a:effectStyle>
-          <a:effectLst>
-            <a:outerShdw blurRad="40000" dist="23000" dir="5400000" rotWithShape="0">
-              <a:srgbClr val="000000">
-                <a:alpha val="35000"/>
-              </a:srgbClr>
-            </a:outerShdw>
-          </a:effectLst>
-        </a:effectStyle>
-        <a:effectStyle>
-          <a:effectLst>
-            <a:outerShdw blurRad="40000" dist="23000" dir="5400000" rotWithShape="0">
-              <a:srgbClr val="000000">
-                <a:alpha val="35000"/>
-              </a:srgbClr>
-            </a:outerShdw>
-          </a:effectLst>
-          <a:scene3d>
-            <a:camera prst="orthographicFront">
-              <a:rot lat="0" lon="0" rev="0"/>
-            </a:camera>
-            <a:lightRig rig="threePt" dir="t">
-              <a:rot lat="0" lon="0" rev="1200000"/>
-            </a:lightRig>
-          </a:scene3d>
-          <a:sp3d>
-            <a:bevelT w="63500" h="25400"/>
-          </a:sp3d>
-        </a:effectStyle>
-      </a:effectStyleLst>
-      <a:bgFillStyleLst>
-        <a:solidFill>
-          <a:schemeClr val="phClr"/>
-        </a:solidFill>
-        <a:gradFill rotWithShape="1">
-          <a:gsLst>
-            <a:gs pos="0">
-              <a:schemeClr val="phClr">
-                <a:tint val="40000"/>
-                <a:satMod val="350000"/>
-              </a:schemeClr>
-            </a:gs>
-            <a:gs pos="40000">
-              <a:schemeClr val="phClr">
-                <a:tint val="45000"/>
-                <a:shade val="99000"/>
-                <a:satMod val="350000"/>
-              </a:schemeClr>
-            </a:gs>
-            <a:gs pos="100000">
-              <a:schemeClr val="phClr">
-                <a:shade val="20000"/>
-                <a:satMod val="255000"/>
-              </a:schemeClr>
-            </a:gs>
-          </a:gsLst>
-          <a:path path="circle">
-            <a:fillToRect l="50000" t="-80000" r="50000" b="180000"/>
-          </a:path>
-        </a:gradFill>
-        <a:gradFill rotWithShape="1">
-          <a:gsLst>
-            <a:gs pos="0">
-              <a:schemeClr val="phClr">
-                <a:tint val="80000"/>
-                <a:satMod val="300000"/>
-              </a:schemeClr>
-            </a:gs>
-            <a:gs pos="100000">
-              <a:schemeClr val="phClr">
-                <a:shade val="30000"/>
-                <a:satMod val="200000"/>
-              </a:schemeClr>
-            </a:gs>
-          </a:gsLst>
-          <a:path path="circle">
-            <a:fillToRect l="50000" t="50000" r="50000" b="50000"/>
-          </a:path>
-        </a:gradFill>
-      </a:bgFillStyleLst>
-    </a:fmtScheme>
-  </a:themeElements>
-</a:theme>
 </file>
</xml_diff>